<commit_message>
small fixes to into slides
</commit_message>
<xml_diff>
--- a/slides/00-CourseIntroduction.pptx
+++ b/slides/00-CourseIntroduction.pptx
@@ -221,7 +221,7 @@
           <a:p>
             <a:fld id="{C5B45307-6ED4-B142-BD64-10F739779302}" type="datetimeFigureOut">
               <a:rPr lang="en-US" smtClean="0"/>
-              <a:t>1/6/25</a:t>
+              <a:t>1/13/25</a:t>
             </a:fld>
             <a:endParaRPr lang="en-US"/>
           </a:p>
@@ -4854,7 +4854,7 @@
           <a:p>
             <a:fld id="{EC4347D3-4C9A-C240-8F14-750059DFEEB0}" type="datetimeFigureOut">
               <a:rPr lang="en-US" smtClean="0"/>
-              <a:t>1/6/25</a:t>
+              <a:t>1/13/25</a:t>
             </a:fld>
             <a:endParaRPr lang="en-US"/>
           </a:p>
@@ -5121,7 +5121,7 @@
           <a:p>
             <a:fld id="{EC4347D3-4C9A-C240-8F14-750059DFEEB0}" type="datetimeFigureOut">
               <a:rPr lang="en-US" smtClean="0"/>
-              <a:t>1/6/25</a:t>
+              <a:t>1/13/25</a:t>
             </a:fld>
             <a:endParaRPr lang="en-US"/>
           </a:p>
@@ -5317,7 +5317,7 @@
           <a:p>
             <a:fld id="{EC4347D3-4C9A-C240-8F14-750059DFEEB0}" type="datetimeFigureOut">
               <a:rPr lang="en-US" smtClean="0"/>
-              <a:t>1/6/25</a:t>
+              <a:t>1/13/25</a:t>
             </a:fld>
             <a:endParaRPr lang="en-US"/>
           </a:p>
@@ -5580,7 +5580,7 @@
           <a:p>
             <a:fld id="{EC4347D3-4C9A-C240-8F14-750059DFEEB0}" type="datetimeFigureOut">
               <a:rPr lang="en-US" smtClean="0"/>
-              <a:t>1/6/25</a:t>
+              <a:t>1/13/25</a:t>
             </a:fld>
             <a:endParaRPr lang="en-US"/>
           </a:p>
@@ -6014,7 +6014,7 @@
           <a:p>
             <a:fld id="{EC4347D3-4C9A-C240-8F14-750059DFEEB0}" type="datetimeFigureOut">
               <a:rPr lang="en-US" smtClean="0"/>
-              <a:t>1/6/25</a:t>
+              <a:t>1/13/25</a:t>
             </a:fld>
             <a:endParaRPr lang="en-US"/>
           </a:p>
@@ -6560,7 +6560,7 @@
           <a:p>
             <a:fld id="{EC4347D3-4C9A-C240-8F14-750059DFEEB0}" type="datetimeFigureOut">
               <a:rPr lang="en-US" smtClean="0"/>
-              <a:t>1/6/25</a:t>
+              <a:t>1/13/25</a:t>
             </a:fld>
             <a:endParaRPr lang="en-US"/>
           </a:p>
@@ -7280,7 +7280,7 @@
           <a:p>
             <a:fld id="{EC4347D3-4C9A-C240-8F14-750059DFEEB0}" type="datetimeFigureOut">
               <a:rPr lang="en-US" smtClean="0"/>
-              <a:t>1/6/25</a:t>
+              <a:t>1/13/25</a:t>
             </a:fld>
             <a:endParaRPr lang="en-US"/>
           </a:p>
@@ -7450,7 +7450,7 @@
           <a:p>
             <a:fld id="{EC4347D3-4C9A-C240-8F14-750059DFEEB0}" type="datetimeFigureOut">
               <a:rPr lang="en-US" smtClean="0"/>
-              <a:t>1/6/25</a:t>
+              <a:t>1/13/25</a:t>
             </a:fld>
             <a:endParaRPr lang="en-US"/>
           </a:p>
@@ -7630,7 +7630,7 @@
           <a:p>
             <a:fld id="{EC4347D3-4C9A-C240-8F14-750059DFEEB0}" type="datetimeFigureOut">
               <a:rPr lang="en-US" smtClean="0"/>
-              <a:t>1/6/25</a:t>
+              <a:t>1/13/25</a:t>
             </a:fld>
             <a:endParaRPr lang="en-US"/>
           </a:p>
@@ -7800,7 +7800,7 @@
           <a:p>
             <a:fld id="{EC4347D3-4C9A-C240-8F14-750059DFEEB0}" type="datetimeFigureOut">
               <a:rPr lang="en-US" smtClean="0"/>
-              <a:t>1/6/25</a:t>
+              <a:t>1/13/25</a:t>
             </a:fld>
             <a:endParaRPr lang="en-US"/>
           </a:p>
@@ -8050,7 +8050,7 @@
           <a:p>
             <a:fld id="{EC4347D3-4C9A-C240-8F14-750059DFEEB0}" type="datetimeFigureOut">
               <a:rPr lang="en-US" smtClean="0"/>
-              <a:t>1/6/25</a:t>
+              <a:t>1/13/25</a:t>
             </a:fld>
             <a:endParaRPr lang="en-US"/>
           </a:p>
@@ -8282,7 +8282,7 @@
           <a:p>
             <a:fld id="{EC4347D3-4C9A-C240-8F14-750059DFEEB0}" type="datetimeFigureOut">
               <a:rPr lang="en-US" smtClean="0"/>
-              <a:t>1/6/25</a:t>
+              <a:t>1/13/25</a:t>
             </a:fld>
             <a:endParaRPr lang="en-US"/>
           </a:p>
@@ -8668,7 +8668,7 @@
           <a:p>
             <a:fld id="{EC4347D3-4C9A-C240-8F14-750059DFEEB0}" type="datetimeFigureOut">
               <a:rPr lang="en-US" smtClean="0"/>
-              <a:t>1/6/25</a:t>
+              <a:t>1/13/25</a:t>
             </a:fld>
             <a:endParaRPr lang="en-US"/>
           </a:p>
@@ -8791,7 +8791,7 @@
           <a:p>
             <a:fld id="{EC4347D3-4C9A-C240-8F14-750059DFEEB0}" type="datetimeFigureOut">
               <a:rPr lang="en-US" smtClean="0"/>
-              <a:t>1/6/25</a:t>
+              <a:t>1/13/25</a:t>
             </a:fld>
             <a:endParaRPr lang="en-US"/>
           </a:p>
@@ -8886,7 +8886,7 @@
           <a:p>
             <a:fld id="{EC4347D3-4C9A-C240-8F14-750059DFEEB0}" type="datetimeFigureOut">
               <a:rPr lang="en-US" smtClean="0"/>
-              <a:t>1/6/25</a:t>
+              <a:t>1/13/25</a:t>
             </a:fld>
             <a:endParaRPr lang="en-US"/>
           </a:p>
@@ -9135,7 +9135,7 @@
           <a:p>
             <a:fld id="{EC4347D3-4C9A-C240-8F14-750059DFEEB0}" type="datetimeFigureOut">
               <a:rPr lang="en-US" smtClean="0"/>
-              <a:t>1/6/25</a:t>
+              <a:t>1/13/25</a:t>
             </a:fld>
             <a:endParaRPr lang="en-US"/>
           </a:p>
@@ -9420,7 +9420,7 @@
           <a:p>
             <a:fld id="{EC4347D3-4C9A-C240-8F14-750059DFEEB0}" type="datetimeFigureOut">
               <a:rPr lang="en-US" smtClean="0"/>
-              <a:t>1/6/25</a:t>
+              <a:t>1/13/25</a:t>
             </a:fld>
             <a:endParaRPr lang="en-US"/>
           </a:p>
@@ -12487,7 +12487,7 @@
           <a:p>
             <a:fld id="{EC4347D3-4C9A-C240-8F14-750059DFEEB0}" type="datetimeFigureOut">
               <a:rPr lang="en-US" smtClean="0"/>
-              <a:t>1/6/25</a:t>
+              <a:t>1/13/25</a:t>
             </a:fld>
             <a:endParaRPr lang="en-US"/>
           </a:p>
@@ -16345,7 +16345,7 @@
             </a:r>
             <a:r>
               <a:rPr lang="en-US" dirty="0"/>
-              <a:t>: 40 percent (split over about 6 or 7 </a:t>
+              <a:t>: 40 percent (split over about 6 </a:t>
             </a:r>
             <a:r>
               <a:rPr lang="en-US" dirty="0" err="1"/>
@@ -16363,7 +16363,7 @@
             </a:r>
             <a:r>
               <a:rPr lang="en-US" dirty="0"/>
-              <a:t>: 30 percent (12 percent each)</a:t>
+              <a:t>: 30 percent (15 percent each)</a:t>
             </a:r>
           </a:p>
           <a:p>
@@ -16532,13 +16532,8 @@
             <a:pPr algn="ctr"/>
             <a:r>
               <a:rPr lang="en-US" dirty="0"/>
-              <a:t>Course </a:t>
-            </a:r>
-            <a:r>
-              <a:rPr lang="en-US" dirty="0" err="1"/>
-              <a:t>OBjectives</a:t>
-            </a:r>
-            <a:endParaRPr lang="en-US" dirty="0"/>
+              <a:t>Course Objectives</a:t>
+            </a:r>
           </a:p>
         </p:txBody>
       </p:sp>
@@ -16971,15 +16966,7 @@
             </a:r>
             <a:r>
               <a:rPr lang="en-US" dirty="0"/>
-              <a:t>: Are reserved for final project </a:t>
-            </a:r>
-            <a:r>
-              <a:rPr lang="en-US" dirty="0" err="1"/>
-              <a:t>presenations</a:t>
-            </a:r>
-            <a:r>
-              <a:rPr lang="en-US" dirty="0"/>
-              <a:t> (more on that in a bit as well).</a:t>
+              <a:t>: Are reserved for final project presentations (more on that in a bit as well).</a:t>
             </a:r>
           </a:p>
           <a:p>

</xml_diff>